<commit_message>
Ver 1.1: missing NRL design and Sample holder design, more PSU antennas info
</commit_message>
<xml_diff>
--- a/Capstone project proposal presentation.pptx
+++ b/Capstone project proposal presentation.pptx
@@ -2,13 +2,13 @@
 <file path=ppt/presentation.xml><?xml version="1.0" encoding="utf-8"?>
 <p:presentation xmlns:a="http://schemas.openxmlformats.org/drawingml/2006/main" xmlns:r="http://schemas.openxmlformats.org/officeDocument/2006/relationships" xmlns:p="http://schemas.openxmlformats.org/presentationml/2006/main" removePersonalInfoOnSave="1" saveSubsetFonts="1">
   <p:sldMasterIdLst>
-    <p:sldMasterId id="2147484128" r:id="rId2"/>
+    <p:sldMasterId id="2147484218" r:id="rId2"/>
   </p:sldMasterIdLst>
   <p:notesMasterIdLst>
-    <p:notesMasterId r:id="rId18"/>
+    <p:notesMasterId r:id="rId19"/>
   </p:notesMasterIdLst>
   <p:handoutMasterIdLst>
-    <p:handoutMasterId r:id="rId19"/>
+    <p:handoutMasterId r:id="rId20"/>
   </p:handoutMasterIdLst>
   <p:sldIdLst>
     <p:sldId id="268" r:id="rId3"/>
@@ -26,6 +26,7 @@
     <p:sldId id="291" r:id="rId15"/>
     <p:sldId id="292" r:id="rId16"/>
     <p:sldId id="277" r:id="rId17"/>
+    <p:sldId id="297" r:id="rId18"/>
   </p:sldIdLst>
   <p:sldSz cx="9144000" cy="6858000" type="screen4x3"/>
   <p:notesSz cx="6858000" cy="9144000"/>
@@ -324,7 +325,7 @@
           <a:p>
             <a:fld id="{BEA74EB7-856E-45FD-83F0-5F7C6F3E4372}" type="datetimeFigureOut">
               <a:rPr lang="en-US"/>
-              <a:t>2/9/17</a:t>
+              <a:t>2/10/17</a:t>
             </a:fld>
             <a:endParaRPr dirty="0"/>
           </a:p>
@@ -489,7 +490,7 @@
           <a:p>
             <a:fld id="{C61B0E40-8125-41F8-BB6C-139D8D531A4F}" type="datetimeFigureOut">
               <a:rPr lang="en-US"/>
-              <a:t>2/9/17</a:t>
+              <a:t>2/10/17</a:t>
             </a:fld>
             <a:endParaRPr dirty="0"/>
           </a:p>
@@ -887,7 +888,7 @@
           </a:lstStyle>
           <a:p>
             <a:r>
-              <a:rPr lang="en-US"/>
+              <a:rPr lang="en-US" smtClean="0"/>
               <a:t>Click to edit Master title style</a:t>
             </a:r>
             <a:endParaRPr lang="en-US" dirty="0"/>
@@ -1007,7 +1008,7 @@
           </a:lstStyle>
           <a:p>
             <a:r>
-              <a:rPr lang="en-US"/>
+              <a:rPr lang="en-US" smtClean="0"/>
               <a:t>Click to edit Master subtitle style</a:t>
             </a:r>
             <a:endParaRPr lang="en-US" dirty="0"/>
@@ -1031,7 +1032,7 @@
           <a:p>
             <a:fld id="{333B76B7-5811-4114-8A95-998148FFD529}" type="datetime1">
               <a:rPr lang="en-US" smtClean="0"/>
-              <a:t>2/9/17</a:t>
+              <a:t>2/10/17</a:t>
             </a:fld>
             <a:endParaRPr lang="en-US" dirty="0"/>
           </a:p>
@@ -1081,11 +1082,6 @@
         </p:txBody>
       </p:sp>
     </p:spTree>
-    <p:extLst>
-      <p:ext uri="{BB962C8B-B14F-4D97-AF65-F5344CB8AC3E}">
-        <p14:creationId xmlns:p14="http://schemas.microsoft.com/office/powerpoint/2010/main" val="3361223991"/>
-      </p:ext>
-    </p:extLst>
   </p:cSld>
   <p:clrMapOvr>
     <a:masterClrMapping/>
@@ -1102,6 +1098,13 @@
       </p:transition>
     </mc:Fallback>
   </mc:AlternateContent>
+  <p:timing>
+    <p:tnLst>
+      <p:par>
+        <p:cTn id="1" dur="indefinite" restart="never" nodeType="tmRoot"/>
+      </p:par>
+    </p:tnLst>
+  </p:timing>
 </p:sldLayout>
 </file>
 
@@ -1149,7 +1152,7 @@
           </a:lstStyle>
           <a:p>
             <a:r>
-              <a:rPr lang="en-US"/>
+              <a:rPr lang="en-US" smtClean="0"/>
               <a:t>Click to edit Master title style</a:t>
             </a:r>
             <a:endParaRPr lang="en-US" dirty="0"/>
@@ -1228,8 +1231,8 @@
           </a:lstStyle>
           <a:p>
             <a:r>
-              <a:rPr lang="en-US"/>
-              <a:t>Click icon to add picture</a:t>
+              <a:rPr lang="en-US" smtClean="0"/>
+              <a:t>Drag picture to placeholder or click icon to add</a:t>
             </a:r>
             <a:endParaRPr lang="en-US" dirty="0"/>
           </a:p>
@@ -1296,8 +1299,8 @@
           <a:p>
             <a:pPr lvl="0"/>
             <a:r>
-              <a:rPr lang="en-US"/>
-              <a:t>Edit Master text styles</a:t>
+              <a:rPr lang="en-US" smtClean="0"/>
+              <a:t>Click to edit Master text styles</a:t>
             </a:r>
           </a:p>
         </p:txBody>
@@ -1319,7 +1322,7 @@
           <a:p>
             <a:fld id="{5C6E67D0-0200-42BE-A0B2-78C70FBBB312}" type="datetime1">
               <a:rPr lang="en-US" smtClean="0"/>
-              <a:t>2/9/17</a:t>
+              <a:t>2/10/17</a:t>
             </a:fld>
             <a:endParaRPr lang="en-US" dirty="0"/>
           </a:p>
@@ -1369,15 +1372,17 @@
         </p:txBody>
       </p:sp>
     </p:spTree>
-    <p:extLst>
-      <p:ext uri="{BB962C8B-B14F-4D97-AF65-F5344CB8AC3E}">
-        <p14:creationId xmlns:p14="http://schemas.microsoft.com/office/powerpoint/2010/main" val="818803363"/>
-      </p:ext>
-    </p:extLst>
   </p:cSld>
   <p:clrMapOvr>
     <a:masterClrMapping/>
   </p:clrMapOvr>
+  <p:timing>
+    <p:tnLst>
+      <p:par>
+        <p:cTn id="1" dur="indefinite" restart="never" nodeType="tmRoot"/>
+      </p:par>
+    </p:tnLst>
+  </p:timing>
   <p:hf sldNum="0" hdr="0" ftr="0" dt="0"/>
 </p:sldLayout>
 </file>
@@ -1424,7 +1429,7 @@
           </a:lstStyle>
           <a:p>
             <a:r>
-              <a:rPr lang="en-US"/>
+              <a:rPr lang="en-US" smtClean="0"/>
               <a:t>Click to edit Master title style</a:t>
             </a:r>
             <a:endParaRPr lang="en-US" dirty="0"/>
@@ -1492,8 +1497,8 @@
           <a:p>
             <a:pPr lvl="0"/>
             <a:r>
-              <a:rPr lang="en-US"/>
-              <a:t>Edit Master text styles</a:t>
+              <a:rPr lang="en-US" smtClean="0"/>
+              <a:t>Click to edit Master text styles</a:t>
             </a:r>
           </a:p>
         </p:txBody>
@@ -1515,7 +1520,7 @@
           <a:p>
             <a:fld id="{5C6E67D0-0200-42BE-A0B2-78C70FBBB312}" type="datetime1">
               <a:rPr lang="en-US" smtClean="0"/>
-              <a:t>2/9/17</a:t>
+              <a:t>2/10/17</a:t>
             </a:fld>
             <a:endParaRPr lang="en-US" dirty="0"/>
           </a:p>
@@ -1565,15 +1570,17 @@
         </p:txBody>
       </p:sp>
     </p:spTree>
-    <p:extLst>
-      <p:ext uri="{BB962C8B-B14F-4D97-AF65-F5344CB8AC3E}">
-        <p14:creationId xmlns:p14="http://schemas.microsoft.com/office/powerpoint/2010/main" val="1853653609"/>
-      </p:ext>
-    </p:extLst>
   </p:cSld>
   <p:clrMapOvr>
     <a:masterClrMapping/>
   </p:clrMapOvr>
+  <p:timing>
+    <p:tnLst>
+      <p:par>
+        <p:cTn id="1" dur="indefinite" restart="never" nodeType="tmRoot"/>
+      </p:par>
+    </p:tnLst>
+  </p:timing>
   <p:hf sldNum="0" hdr="0" ftr="0" dt="0"/>
 </p:sldLayout>
 </file>
@@ -1620,7 +1627,7 @@
           </a:lstStyle>
           <a:p>
             <a:r>
-              <a:rPr lang="en-US"/>
+              <a:rPr lang="en-US" smtClean="0"/>
               <a:t>Click to edit Master title style</a:t>
             </a:r>
             <a:endParaRPr lang="en-US" dirty="0"/>
@@ -1700,8 +1707,8 @@
               <a:buNone/>
             </a:pPr>
             <a:r>
-              <a:rPr lang="en-US"/>
-              <a:t>Edit Master text styles</a:t>
+              <a:rPr lang="en-US" smtClean="0"/>
+              <a:t>Click to edit Master text styles</a:t>
             </a:r>
           </a:p>
         </p:txBody>
@@ -1767,8 +1774,8 @@
           <a:p>
             <a:pPr lvl="0"/>
             <a:r>
-              <a:rPr lang="en-US"/>
-              <a:t>Edit Master text styles</a:t>
+              <a:rPr lang="en-US" smtClean="0"/>
+              <a:t>Click to edit Master text styles</a:t>
             </a:r>
           </a:p>
         </p:txBody>
@@ -1790,7 +1797,7 @@
           <a:p>
             <a:fld id="{5C6E67D0-0200-42BE-A0B2-78C70FBBB312}" type="datetime1">
               <a:rPr lang="en-US" smtClean="0"/>
-              <a:t>2/9/17</a:t>
+              <a:t>2/10/17</a:t>
             </a:fld>
             <a:endParaRPr lang="en-US" dirty="0"/>
           </a:p>
@@ -1934,15 +1941,17 @@
         </p:txBody>
       </p:sp>
     </p:spTree>
-    <p:extLst>
-      <p:ext uri="{BB962C8B-B14F-4D97-AF65-F5344CB8AC3E}">
-        <p14:creationId xmlns:p14="http://schemas.microsoft.com/office/powerpoint/2010/main" val="2905544621"/>
-      </p:ext>
-    </p:extLst>
   </p:cSld>
   <p:clrMapOvr>
     <a:masterClrMapping/>
   </p:clrMapOvr>
+  <p:timing>
+    <p:tnLst>
+      <p:par>
+        <p:cTn id="1" dur="indefinite" restart="never" nodeType="tmRoot"/>
+      </p:par>
+    </p:tnLst>
+  </p:timing>
   <p:hf sldNum="0" hdr="0" ftr="0" dt="0"/>
 </p:sldLayout>
 </file>
@@ -1989,7 +1998,7 @@
           </a:lstStyle>
           <a:p>
             <a:r>
-              <a:rPr lang="en-US"/>
+              <a:rPr lang="en-US" smtClean="0"/>
               <a:t>Click to edit Master title style</a:t>
             </a:r>
             <a:endParaRPr lang="en-US" dirty="0"/>
@@ -2110,8 +2119,8 @@
           <a:p>
             <a:pPr lvl="0"/>
             <a:r>
-              <a:rPr lang="en-US"/>
-              <a:t>Edit Master text styles</a:t>
+              <a:rPr lang="en-US" smtClean="0"/>
+              <a:t>Click to edit Master text styles</a:t>
             </a:r>
           </a:p>
         </p:txBody>
@@ -2133,7 +2142,7 @@
           <a:p>
             <a:fld id="{5C6E67D0-0200-42BE-A0B2-78C70FBBB312}" type="datetime1">
               <a:rPr lang="en-US" smtClean="0"/>
-              <a:t>2/9/17</a:t>
+              <a:t>2/10/17</a:t>
             </a:fld>
             <a:endParaRPr lang="en-US" dirty="0"/>
           </a:p>
@@ -2183,15 +2192,17 @@
         </p:txBody>
       </p:sp>
     </p:spTree>
-    <p:extLst>
-      <p:ext uri="{BB962C8B-B14F-4D97-AF65-F5344CB8AC3E}">
-        <p14:creationId xmlns:p14="http://schemas.microsoft.com/office/powerpoint/2010/main" val="3247420984"/>
-      </p:ext>
-    </p:extLst>
   </p:cSld>
   <p:clrMapOvr>
     <a:masterClrMapping/>
   </p:clrMapOvr>
+  <p:timing>
+    <p:tnLst>
+      <p:par>
+        <p:cTn id="1" dur="indefinite" restart="never" nodeType="tmRoot"/>
+      </p:par>
+    </p:tnLst>
+  </p:timing>
   <p:hf sldNum="0" hdr="0" ftr="0" dt="0"/>
 </p:sldLayout>
 </file>
@@ -2233,7 +2244,7 @@
           </a:lstStyle>
           <a:p>
             <a:r>
-              <a:rPr lang="en-US"/>
+              <a:rPr lang="en-US" smtClean="0"/>
               <a:t>Click to edit Master title style</a:t>
             </a:r>
             <a:endParaRPr lang="en-US" dirty="0"/>
@@ -2308,8 +2319,8 @@
           <a:p>
             <a:pPr lvl="0"/>
             <a:r>
-              <a:rPr lang="en-US"/>
-              <a:t>Edit Master text styles</a:t>
+              <a:rPr lang="en-US" smtClean="0"/>
+              <a:t>Click to edit Master text styles</a:t>
             </a:r>
           </a:p>
         </p:txBody>
@@ -2375,8 +2386,8 @@
           <a:p>
             <a:pPr lvl="0"/>
             <a:r>
-              <a:rPr lang="en-US"/>
-              <a:t>Edit Master text styles</a:t>
+              <a:rPr lang="en-US" smtClean="0"/>
+              <a:t>Click to edit Master text styles</a:t>
             </a:r>
           </a:p>
         </p:txBody>
@@ -2449,8 +2460,8 @@
           <a:p>
             <a:pPr lvl="0"/>
             <a:r>
-              <a:rPr lang="en-US"/>
-              <a:t>Edit Master text styles</a:t>
+              <a:rPr lang="en-US" smtClean="0"/>
+              <a:t>Click to edit Master text styles</a:t>
             </a:r>
           </a:p>
         </p:txBody>
@@ -2516,8 +2527,8 @@
           <a:p>
             <a:pPr lvl="0"/>
             <a:r>
-              <a:rPr lang="en-US"/>
-              <a:t>Edit Master text styles</a:t>
+              <a:rPr lang="en-US" smtClean="0"/>
+              <a:t>Click to edit Master text styles</a:t>
             </a:r>
           </a:p>
         </p:txBody>
@@ -2590,8 +2601,8 @@
           <a:p>
             <a:pPr lvl="0"/>
             <a:r>
-              <a:rPr lang="en-US"/>
-              <a:t>Edit Master text styles</a:t>
+              <a:rPr lang="en-US" smtClean="0"/>
+              <a:t>Click to edit Master text styles</a:t>
             </a:r>
           </a:p>
         </p:txBody>
@@ -2657,8 +2668,8 @@
           <a:p>
             <a:pPr lvl="0"/>
             <a:r>
-              <a:rPr lang="en-US"/>
-              <a:t>Edit Master text styles</a:t>
+              <a:rPr lang="en-US" smtClean="0"/>
+              <a:t>Click to edit Master text styles</a:t>
             </a:r>
           </a:p>
         </p:txBody>
@@ -2758,7 +2769,7 @@
           <a:p>
             <a:fld id="{5C6E67D0-0200-42BE-A0B2-78C70FBBB312}" type="datetime1">
               <a:rPr lang="en-US" smtClean="0"/>
-              <a:t>2/9/17</a:t>
+              <a:t>2/10/17</a:t>
             </a:fld>
             <a:endParaRPr lang="en-US" dirty="0"/>
           </a:p>
@@ -2808,15 +2819,17 @@
         </p:txBody>
       </p:sp>
     </p:spTree>
-    <p:extLst>
-      <p:ext uri="{BB962C8B-B14F-4D97-AF65-F5344CB8AC3E}">
-        <p14:creationId xmlns:p14="http://schemas.microsoft.com/office/powerpoint/2010/main" val="3385298100"/>
-      </p:ext>
-    </p:extLst>
   </p:cSld>
   <p:clrMapOvr>
     <a:masterClrMapping/>
   </p:clrMapOvr>
+  <p:timing>
+    <p:tnLst>
+      <p:par>
+        <p:cTn id="1" dur="indefinite" restart="never" nodeType="tmRoot"/>
+      </p:par>
+    </p:tnLst>
+  </p:timing>
   <p:hf sldNum="0" hdr="0" ftr="0" dt="0"/>
 </p:sldLayout>
 </file>
@@ -2858,7 +2871,7 @@
           </a:lstStyle>
           <a:p>
             <a:r>
-              <a:rPr lang="en-US"/>
+              <a:rPr lang="en-US" smtClean="0"/>
               <a:t>Click to edit Master title style</a:t>
             </a:r>
             <a:endParaRPr lang="en-US" dirty="0"/>
@@ -2933,8 +2946,8 @@
           <a:p>
             <a:pPr lvl="0"/>
             <a:r>
-              <a:rPr lang="en-US"/>
-              <a:t>Edit Master text styles</a:t>
+              <a:rPr lang="en-US" smtClean="0"/>
+              <a:t>Click to edit Master text styles</a:t>
             </a:r>
           </a:p>
         </p:txBody>
@@ -3011,8 +3024,8 @@
           </a:lstStyle>
           <a:p>
             <a:r>
-              <a:rPr lang="en-US"/>
-              <a:t>Click icon to add picture</a:t>
+              <a:rPr lang="en-US" smtClean="0"/>
+              <a:t>Drag picture to placeholder or click icon to add</a:t>
             </a:r>
             <a:endParaRPr lang="en-US" dirty="0"/>
           </a:p>
@@ -3079,8 +3092,8 @@
           <a:p>
             <a:pPr lvl="0"/>
             <a:r>
-              <a:rPr lang="en-US"/>
-              <a:t>Edit Master text styles</a:t>
+              <a:rPr lang="en-US" smtClean="0"/>
+              <a:t>Click to edit Master text styles</a:t>
             </a:r>
           </a:p>
         </p:txBody>
@@ -3153,8 +3166,8 @@
           <a:p>
             <a:pPr lvl="0"/>
             <a:r>
-              <a:rPr lang="en-US"/>
-              <a:t>Edit Master text styles</a:t>
+              <a:rPr lang="en-US" smtClean="0"/>
+              <a:t>Click to edit Master text styles</a:t>
             </a:r>
           </a:p>
         </p:txBody>
@@ -3231,8 +3244,8 @@
           </a:lstStyle>
           <a:p>
             <a:r>
-              <a:rPr lang="en-US"/>
-              <a:t>Click icon to add picture</a:t>
+              <a:rPr lang="en-US" smtClean="0"/>
+              <a:t>Drag picture to placeholder or click icon to add</a:t>
             </a:r>
             <a:endParaRPr lang="en-US" dirty="0"/>
           </a:p>
@@ -3299,8 +3312,8 @@
           <a:p>
             <a:pPr lvl="0"/>
             <a:r>
-              <a:rPr lang="en-US"/>
-              <a:t>Edit Master text styles</a:t>
+              <a:rPr lang="en-US" smtClean="0"/>
+              <a:t>Click to edit Master text styles</a:t>
             </a:r>
           </a:p>
         </p:txBody>
@@ -3373,8 +3386,8 @@
           <a:p>
             <a:pPr lvl="0"/>
             <a:r>
-              <a:rPr lang="en-US"/>
-              <a:t>Edit Master text styles</a:t>
+              <a:rPr lang="en-US" smtClean="0"/>
+              <a:t>Click to edit Master text styles</a:t>
             </a:r>
           </a:p>
         </p:txBody>
@@ -3451,8 +3464,8 @@
           </a:lstStyle>
           <a:p>
             <a:r>
-              <a:rPr lang="en-US"/>
-              <a:t>Click icon to add picture</a:t>
+              <a:rPr lang="en-US" smtClean="0"/>
+              <a:t>Drag picture to placeholder or click icon to add</a:t>
             </a:r>
             <a:endParaRPr lang="en-US" dirty="0"/>
           </a:p>
@@ -3519,8 +3532,8 @@
           <a:p>
             <a:pPr lvl="0"/>
             <a:r>
-              <a:rPr lang="en-US"/>
-              <a:t>Edit Master text styles</a:t>
+              <a:rPr lang="en-US" smtClean="0"/>
+              <a:t>Click to edit Master text styles</a:t>
             </a:r>
           </a:p>
         </p:txBody>
@@ -3620,7 +3633,7 @@
           <a:p>
             <a:fld id="{5C6E67D0-0200-42BE-A0B2-78C70FBBB312}" type="datetime1">
               <a:rPr lang="en-US" smtClean="0"/>
-              <a:t>2/9/17</a:t>
+              <a:t>2/10/17</a:t>
             </a:fld>
             <a:endParaRPr lang="en-US" dirty="0"/>
           </a:p>
@@ -3670,15 +3683,17 @@
         </p:txBody>
       </p:sp>
     </p:spTree>
-    <p:extLst>
-      <p:ext uri="{BB962C8B-B14F-4D97-AF65-F5344CB8AC3E}">
-        <p14:creationId xmlns:p14="http://schemas.microsoft.com/office/powerpoint/2010/main" val="1497517815"/>
-      </p:ext>
-    </p:extLst>
   </p:cSld>
   <p:clrMapOvr>
     <a:masterClrMapping/>
   </p:clrMapOvr>
+  <p:timing>
+    <p:tnLst>
+      <p:par>
+        <p:cTn id="1" dur="indefinite" restart="never" nodeType="tmRoot"/>
+      </p:par>
+    </p:tnLst>
+  </p:timing>
   <p:hf sldNum="0" hdr="0" ftr="0" dt="0"/>
 </p:sldLayout>
 </file>
@@ -3716,7 +3731,7 @@
           <a:lstStyle/>
           <a:p>
             <a:r>
-              <a:rPr lang="en-US"/>
+              <a:rPr lang="en-US" smtClean="0"/>
               <a:t>Click to edit Master title style</a:t>
             </a:r>
             <a:endParaRPr lang="en-US" dirty="0"/>
@@ -3740,35 +3755,35 @@
           <a:p>
             <a:pPr lvl="0"/>
             <a:r>
-              <a:rPr lang="en-US"/>
-              <a:t>Edit Master text styles</a:t>
+              <a:rPr lang="en-US" smtClean="0"/>
+              <a:t>Click to edit Master text styles</a:t>
             </a:r>
           </a:p>
           <a:p>
             <a:pPr lvl="1"/>
             <a:r>
-              <a:rPr lang="en-US"/>
+              <a:rPr lang="en-US" smtClean="0"/>
               <a:t>Second level</a:t>
             </a:r>
           </a:p>
           <a:p>
             <a:pPr lvl="2"/>
             <a:r>
-              <a:rPr lang="en-US"/>
+              <a:rPr lang="en-US" smtClean="0"/>
               <a:t>Third level</a:t>
             </a:r>
           </a:p>
           <a:p>
             <a:pPr lvl="3"/>
             <a:r>
-              <a:rPr lang="en-US"/>
+              <a:rPr lang="en-US" smtClean="0"/>
               <a:t>Fourth level</a:t>
             </a:r>
           </a:p>
           <a:p>
             <a:pPr lvl="4"/>
             <a:r>
-              <a:rPr lang="en-US"/>
+              <a:rPr lang="en-US" smtClean="0"/>
               <a:t>Fifth level</a:t>
             </a:r>
             <a:endParaRPr lang="en-US" dirty="0"/>
@@ -3792,7 +3807,7 @@
           <a:p>
             <a:fld id="{175C077A-EF7A-41AA-8976-110EB7416C60}" type="datetime1">
               <a:rPr lang="en-US" smtClean="0"/>
-              <a:t>2/9/17</a:t>
+              <a:t>2/10/17</a:t>
             </a:fld>
             <a:endParaRPr lang="en-US" dirty="0"/>
           </a:p>
@@ -3842,11 +3857,6 @@
         </p:txBody>
       </p:sp>
     </p:spTree>
-    <p:extLst>
-      <p:ext uri="{BB962C8B-B14F-4D97-AF65-F5344CB8AC3E}">
-        <p14:creationId xmlns:p14="http://schemas.microsoft.com/office/powerpoint/2010/main" val="3252356587"/>
-      </p:ext>
-    </p:extLst>
   </p:cSld>
   <p:clrMapOvr>
     <a:masterClrMapping/>
@@ -3863,6 +3873,13 @@
       </p:transition>
     </mc:Fallback>
   </mc:AlternateContent>
+  <p:timing>
+    <p:tnLst>
+      <p:par>
+        <p:cTn id="1" dur="indefinite" restart="never" nodeType="tmRoot"/>
+      </p:par>
+    </p:tnLst>
+  </p:timing>
 </p:sldLayout>
 </file>
 
@@ -3904,7 +3921,7 @@
           <a:lstStyle/>
           <a:p>
             <a:r>
-              <a:rPr lang="en-US"/>
+              <a:rPr lang="en-US" smtClean="0"/>
               <a:t>Click to edit Master title style</a:t>
             </a:r>
             <a:endParaRPr lang="en-US" dirty="0"/>
@@ -3933,35 +3950,35 @@
           <a:p>
             <a:pPr lvl="0"/>
             <a:r>
-              <a:rPr lang="en-US"/>
-              <a:t>Edit Master text styles</a:t>
+              <a:rPr lang="en-US" smtClean="0"/>
+              <a:t>Click to edit Master text styles</a:t>
             </a:r>
           </a:p>
           <a:p>
             <a:pPr lvl="1"/>
             <a:r>
-              <a:rPr lang="en-US"/>
+              <a:rPr lang="en-US" smtClean="0"/>
               <a:t>Second level</a:t>
             </a:r>
           </a:p>
           <a:p>
             <a:pPr lvl="2"/>
             <a:r>
-              <a:rPr lang="en-US"/>
+              <a:rPr lang="en-US" smtClean="0"/>
               <a:t>Third level</a:t>
             </a:r>
           </a:p>
           <a:p>
             <a:pPr lvl="3"/>
             <a:r>
-              <a:rPr lang="en-US"/>
+              <a:rPr lang="en-US" smtClean="0"/>
               <a:t>Fourth level</a:t>
             </a:r>
           </a:p>
           <a:p>
             <a:pPr lvl="4"/>
             <a:r>
-              <a:rPr lang="en-US"/>
+              <a:rPr lang="en-US" smtClean="0"/>
               <a:t>Fifth level</a:t>
             </a:r>
             <a:endParaRPr lang="en-US" dirty="0"/>
@@ -3985,7 +4002,7 @@
           <a:p>
             <a:fld id="{CFF5912B-6681-4BDF-AE10-F59636249FF3}" type="datetime1">
               <a:rPr lang="en-US" smtClean="0"/>
-              <a:t>2/9/17</a:t>
+              <a:t>2/10/17</a:t>
             </a:fld>
             <a:endParaRPr lang="en-US" dirty="0"/>
           </a:p>
@@ -4035,11 +4052,6 @@
         </p:txBody>
       </p:sp>
     </p:spTree>
-    <p:extLst>
-      <p:ext uri="{BB962C8B-B14F-4D97-AF65-F5344CB8AC3E}">
-        <p14:creationId xmlns:p14="http://schemas.microsoft.com/office/powerpoint/2010/main" val="2779360286"/>
-      </p:ext>
-    </p:extLst>
   </p:cSld>
   <p:clrMapOvr>
     <a:masterClrMapping/>
@@ -4056,6 +4068,13 @@
       </p:transition>
     </mc:Fallback>
   </mc:AlternateContent>
+  <p:timing>
+    <p:tnLst>
+      <p:par>
+        <p:cTn id="1" dur="indefinite" restart="never" nodeType="tmRoot"/>
+      </p:par>
+    </p:tnLst>
+  </p:timing>
 </p:sldLayout>
 </file>
 
@@ -4093,7 +4112,7 @@
           <a:p>
             <a:fld id="{905C8E22-D0BA-4CB4-9C32-B27533199514}" type="datetime1">
               <a:rPr lang="en-US" smtClean="0"/>
-              <a:t>2/9/17</a:t>
+              <a:t>2/10/17</a:t>
             </a:fld>
             <a:endParaRPr dirty="0"/>
           </a:p>
@@ -4281,7 +4300,7 @@
           <a:lstStyle/>
           <a:p>
             <a:r>
-              <a:rPr lang="en-US"/>
+              <a:rPr lang="en-US" smtClean="0"/>
               <a:t>Click to edit Master title style</a:t>
             </a:r>
             <a:endParaRPr lang="en-US" dirty="0"/>
@@ -4305,35 +4324,35 @@
           <a:p>
             <a:pPr lvl="0"/>
             <a:r>
-              <a:rPr lang="en-US"/>
-              <a:t>Edit Master text styles</a:t>
+              <a:rPr lang="en-US" smtClean="0"/>
+              <a:t>Click to edit Master text styles</a:t>
             </a:r>
           </a:p>
           <a:p>
             <a:pPr lvl="1"/>
             <a:r>
-              <a:rPr lang="en-US"/>
+              <a:rPr lang="en-US" smtClean="0"/>
               <a:t>Second level</a:t>
             </a:r>
           </a:p>
           <a:p>
             <a:pPr lvl="2"/>
             <a:r>
-              <a:rPr lang="en-US"/>
+              <a:rPr lang="en-US" smtClean="0"/>
               <a:t>Third level</a:t>
             </a:r>
           </a:p>
           <a:p>
             <a:pPr lvl="3"/>
             <a:r>
-              <a:rPr lang="en-US"/>
+              <a:rPr lang="en-US" smtClean="0"/>
               <a:t>Fourth level</a:t>
             </a:r>
           </a:p>
           <a:p>
             <a:pPr lvl="4"/>
             <a:r>
-              <a:rPr lang="en-US"/>
+              <a:rPr lang="en-US" smtClean="0"/>
               <a:t>Fifth level</a:t>
             </a:r>
             <a:endParaRPr lang="en-US" dirty="0"/>
@@ -4357,7 +4376,7 @@
           <a:p>
             <a:fld id="{FC2180A9-7A83-412D-A8AC-5AF60A8AA507}" type="datetime1">
               <a:rPr lang="en-US" smtClean="0"/>
-              <a:t>2/9/17</a:t>
+              <a:t>2/10/17</a:t>
             </a:fld>
             <a:endParaRPr lang="en-US" dirty="0"/>
           </a:p>
@@ -4407,11 +4426,6 @@
         </p:txBody>
       </p:sp>
     </p:spTree>
-    <p:extLst>
-      <p:ext uri="{BB962C8B-B14F-4D97-AF65-F5344CB8AC3E}">
-        <p14:creationId xmlns:p14="http://schemas.microsoft.com/office/powerpoint/2010/main" val="1603510989"/>
-      </p:ext>
-    </p:extLst>
   </p:cSld>
   <p:clrMapOvr>
     <a:masterClrMapping/>
@@ -4428,6 +4442,13 @@
       </p:transition>
     </mc:Fallback>
   </mc:AlternateContent>
+  <p:timing>
+    <p:tnLst>
+      <p:par>
+        <p:cTn id="1" dur="indefinite" restart="never" nodeType="tmRoot"/>
+      </p:par>
+    </p:tnLst>
+  </p:timing>
 </p:sldLayout>
 </file>
 
@@ -4473,7 +4494,7 @@
           </a:lstStyle>
           <a:p>
             <a:r>
-              <a:rPr lang="en-US"/>
+              <a:rPr lang="en-US" smtClean="0"/>
               <a:t>Click to edit Master title style</a:t>
             </a:r>
             <a:endParaRPr lang="en-US" dirty="0"/>
@@ -4594,8 +4615,8 @@
           <a:p>
             <a:pPr lvl="0"/>
             <a:r>
-              <a:rPr lang="en-US"/>
-              <a:t>Edit Master text styles</a:t>
+              <a:rPr lang="en-US" smtClean="0"/>
+              <a:t>Click to edit Master text styles</a:t>
             </a:r>
           </a:p>
         </p:txBody>
@@ -4617,7 +4638,7 @@
           <a:p>
             <a:fld id="{6A563DF0-FDDF-4143-9D8C-6AF41892E174}" type="datetime1">
               <a:rPr lang="en-US" smtClean="0"/>
-              <a:t>2/9/17</a:t>
+              <a:t>2/10/17</a:t>
             </a:fld>
             <a:endParaRPr lang="en-US" dirty="0"/>
           </a:p>
@@ -4667,11 +4688,6 @@
         </p:txBody>
       </p:sp>
     </p:spTree>
-    <p:extLst>
-      <p:ext uri="{BB962C8B-B14F-4D97-AF65-F5344CB8AC3E}">
-        <p14:creationId xmlns:p14="http://schemas.microsoft.com/office/powerpoint/2010/main" val="2162741367"/>
-      </p:ext>
-    </p:extLst>
   </p:cSld>
   <p:clrMapOvr>
     <a:masterClrMapping/>
@@ -4688,6 +4704,13 @@
       </p:transition>
     </mc:Fallback>
   </mc:AlternateContent>
+  <p:timing>
+    <p:tnLst>
+      <p:par>
+        <p:cTn id="1" dur="indefinite" restart="never" nodeType="tmRoot"/>
+      </p:par>
+    </p:tnLst>
+  </p:timing>
 </p:sldLayout>
 </file>
 
@@ -4724,7 +4747,7 @@
           <a:lstStyle/>
           <a:p>
             <a:r>
-              <a:rPr lang="en-US"/>
+              <a:rPr lang="en-US" smtClean="0"/>
               <a:t>Click to edit Master title style</a:t>
             </a:r>
             <a:endParaRPr lang="en-US" dirty="0"/>
@@ -4783,35 +4806,35 @@
           <a:p>
             <a:pPr lvl="0"/>
             <a:r>
-              <a:rPr lang="en-US"/>
-              <a:t>Edit Master text styles</a:t>
+              <a:rPr lang="en-US" smtClean="0"/>
+              <a:t>Click to edit Master text styles</a:t>
             </a:r>
           </a:p>
           <a:p>
             <a:pPr lvl="1"/>
             <a:r>
-              <a:rPr lang="en-US"/>
+              <a:rPr lang="en-US" smtClean="0"/>
               <a:t>Second level</a:t>
             </a:r>
           </a:p>
           <a:p>
             <a:pPr lvl="2"/>
             <a:r>
-              <a:rPr lang="en-US"/>
+              <a:rPr lang="en-US" smtClean="0"/>
               <a:t>Third level</a:t>
             </a:r>
           </a:p>
           <a:p>
             <a:pPr lvl="3"/>
             <a:r>
-              <a:rPr lang="en-US"/>
+              <a:rPr lang="en-US" smtClean="0"/>
               <a:t>Fourth level</a:t>
             </a:r>
           </a:p>
           <a:p>
             <a:pPr lvl="4"/>
             <a:r>
-              <a:rPr lang="en-US"/>
+              <a:rPr lang="en-US" smtClean="0"/>
               <a:t>Fifth level</a:t>
             </a:r>
             <a:endParaRPr lang="en-US" dirty="0"/>
@@ -4870,35 +4893,35 @@
           <a:p>
             <a:pPr lvl="0"/>
             <a:r>
-              <a:rPr lang="en-US"/>
-              <a:t>Edit Master text styles</a:t>
+              <a:rPr lang="en-US" smtClean="0"/>
+              <a:t>Click to edit Master text styles</a:t>
             </a:r>
           </a:p>
           <a:p>
             <a:pPr lvl="1"/>
             <a:r>
-              <a:rPr lang="en-US"/>
+              <a:rPr lang="en-US" smtClean="0"/>
               <a:t>Second level</a:t>
             </a:r>
           </a:p>
           <a:p>
             <a:pPr lvl="2"/>
             <a:r>
-              <a:rPr lang="en-US"/>
+              <a:rPr lang="en-US" smtClean="0"/>
               <a:t>Third level</a:t>
             </a:r>
           </a:p>
           <a:p>
             <a:pPr lvl="3"/>
             <a:r>
-              <a:rPr lang="en-US"/>
+              <a:rPr lang="en-US" smtClean="0"/>
               <a:t>Fourth level</a:t>
             </a:r>
           </a:p>
           <a:p>
             <a:pPr lvl="4"/>
             <a:r>
-              <a:rPr lang="en-US"/>
+              <a:rPr lang="en-US" smtClean="0"/>
               <a:t>Fifth level</a:t>
             </a:r>
             <a:endParaRPr lang="en-US" dirty="0"/>
@@ -4922,7 +4945,7 @@
           <a:p>
             <a:fld id="{38BB83F9-4677-4C31-8407-7919061A580B}" type="datetime1">
               <a:rPr lang="en-US" smtClean="0"/>
-              <a:t>2/9/17</a:t>
+              <a:t>2/10/17</a:t>
             </a:fld>
             <a:endParaRPr lang="en-US" dirty="0"/>
           </a:p>
@@ -4972,11 +4995,6 @@
         </p:txBody>
       </p:sp>
     </p:spTree>
-    <p:extLst>
-      <p:ext uri="{BB962C8B-B14F-4D97-AF65-F5344CB8AC3E}">
-        <p14:creationId xmlns:p14="http://schemas.microsoft.com/office/powerpoint/2010/main" val="1243723904"/>
-      </p:ext>
-    </p:extLst>
   </p:cSld>
   <p:clrMapOvr>
     <a:masterClrMapping/>
@@ -4993,6 +5011,13 @@
       </p:transition>
     </mc:Fallback>
   </mc:AlternateContent>
+  <p:timing>
+    <p:tnLst>
+      <p:par>
+        <p:cTn id="1" dur="indefinite" restart="never" nodeType="tmRoot"/>
+      </p:par>
+    </p:tnLst>
+  </p:timing>
 </p:sldLayout>
 </file>
 
@@ -5033,7 +5058,7 @@
           </a:lstStyle>
           <a:p>
             <a:r>
-              <a:rPr lang="en-US"/>
+              <a:rPr lang="en-US" smtClean="0"/>
               <a:t>Click to edit Master title style</a:t>
             </a:r>
             <a:endParaRPr lang="en-US" dirty="0"/>
@@ -5108,8 +5133,8 @@
           <a:p>
             <a:pPr lvl="0"/>
             <a:r>
-              <a:rPr lang="en-US"/>
-              <a:t>Edit Master text styles</a:t>
+              <a:rPr lang="en-US" smtClean="0"/>
+              <a:t>Click to edit Master text styles</a:t>
             </a:r>
           </a:p>
         </p:txBody>
@@ -5166,35 +5191,35 @@
           <a:p>
             <a:pPr lvl="0"/>
             <a:r>
-              <a:rPr lang="en-US"/>
-              <a:t>Edit Master text styles</a:t>
+              <a:rPr lang="en-US" smtClean="0"/>
+              <a:t>Click to edit Master text styles</a:t>
             </a:r>
           </a:p>
           <a:p>
             <a:pPr lvl="1"/>
             <a:r>
-              <a:rPr lang="en-US"/>
+              <a:rPr lang="en-US" smtClean="0"/>
               <a:t>Second level</a:t>
             </a:r>
           </a:p>
           <a:p>
             <a:pPr lvl="2"/>
             <a:r>
-              <a:rPr lang="en-US"/>
+              <a:rPr lang="en-US" smtClean="0"/>
               <a:t>Third level</a:t>
             </a:r>
           </a:p>
           <a:p>
             <a:pPr lvl="3"/>
             <a:r>
-              <a:rPr lang="en-US"/>
+              <a:rPr lang="en-US" smtClean="0"/>
               <a:t>Fourth level</a:t>
             </a:r>
           </a:p>
           <a:p>
             <a:pPr lvl="4"/>
             <a:r>
-              <a:rPr lang="en-US"/>
+              <a:rPr lang="en-US" smtClean="0"/>
               <a:t>Fifth level</a:t>
             </a:r>
             <a:endParaRPr lang="en-US" dirty="0"/>
@@ -5269,8 +5294,8 @@
           <a:p>
             <a:pPr lvl="0"/>
             <a:r>
-              <a:rPr lang="en-US"/>
-              <a:t>Edit Master text styles</a:t>
+              <a:rPr lang="en-US" smtClean="0"/>
+              <a:t>Click to edit Master text styles</a:t>
             </a:r>
           </a:p>
         </p:txBody>
@@ -5327,35 +5352,35 @@
           <a:p>
             <a:pPr lvl="0"/>
             <a:r>
-              <a:rPr lang="en-US"/>
-              <a:t>Edit Master text styles</a:t>
+              <a:rPr lang="en-US" smtClean="0"/>
+              <a:t>Click to edit Master text styles</a:t>
             </a:r>
           </a:p>
           <a:p>
             <a:pPr lvl="1"/>
             <a:r>
-              <a:rPr lang="en-US"/>
+              <a:rPr lang="en-US" smtClean="0"/>
               <a:t>Second level</a:t>
             </a:r>
           </a:p>
           <a:p>
             <a:pPr lvl="2"/>
             <a:r>
-              <a:rPr lang="en-US"/>
+              <a:rPr lang="en-US" smtClean="0"/>
               <a:t>Third level</a:t>
             </a:r>
           </a:p>
           <a:p>
             <a:pPr lvl="3"/>
             <a:r>
-              <a:rPr lang="en-US"/>
+              <a:rPr lang="en-US" smtClean="0"/>
               <a:t>Fourth level</a:t>
             </a:r>
           </a:p>
           <a:p>
             <a:pPr lvl="4"/>
             <a:r>
-              <a:rPr lang="en-US"/>
+              <a:rPr lang="en-US" smtClean="0"/>
               <a:t>Fifth level</a:t>
             </a:r>
             <a:endParaRPr lang="en-US" dirty="0"/>
@@ -5379,7 +5404,7 @@
           <a:p>
             <a:fld id="{C33939A6-3450-434F-A872-BEE63F7EB093}" type="datetime1">
               <a:rPr lang="en-US" smtClean="0"/>
-              <a:t>2/9/17</a:t>
+              <a:t>2/10/17</a:t>
             </a:fld>
             <a:endParaRPr lang="en-US" dirty="0"/>
           </a:p>
@@ -5429,11 +5454,6 @@
         </p:txBody>
       </p:sp>
     </p:spTree>
-    <p:extLst>
-      <p:ext uri="{BB962C8B-B14F-4D97-AF65-F5344CB8AC3E}">
-        <p14:creationId xmlns:p14="http://schemas.microsoft.com/office/powerpoint/2010/main" val="1277455362"/>
-      </p:ext>
-    </p:extLst>
   </p:cSld>
   <p:clrMapOvr>
     <a:masterClrMapping/>
@@ -5450,6 +5470,13 @@
       </p:transition>
     </mc:Fallback>
   </mc:AlternateContent>
+  <p:timing>
+    <p:tnLst>
+      <p:par>
+        <p:cTn id="1" dur="indefinite" restart="never" nodeType="tmRoot"/>
+      </p:par>
+    </p:tnLst>
+  </p:timing>
 </p:sldLayout>
 </file>
 
@@ -5486,7 +5513,7 @@
           <a:lstStyle/>
           <a:p>
             <a:r>
-              <a:rPr lang="en-US"/>
+              <a:rPr lang="en-US" smtClean="0"/>
               <a:t>Click to edit Master title style</a:t>
             </a:r>
             <a:endParaRPr lang="en-US" dirty="0"/>
@@ -5510,7 +5537,7 @@
           <a:p>
             <a:fld id="{E3BABB1C-FA00-4171-BA31-4C5E719472F3}" type="datetime1">
               <a:rPr lang="en-US" smtClean="0"/>
-              <a:t>2/9/17</a:t>
+              <a:t>2/10/17</a:t>
             </a:fld>
             <a:endParaRPr lang="en-US" dirty="0"/>
           </a:p>
@@ -5560,11 +5587,6 @@
         </p:txBody>
       </p:sp>
     </p:spTree>
-    <p:extLst>
-      <p:ext uri="{BB962C8B-B14F-4D97-AF65-F5344CB8AC3E}">
-        <p14:creationId xmlns:p14="http://schemas.microsoft.com/office/powerpoint/2010/main" val="3179370916"/>
-      </p:ext>
-    </p:extLst>
   </p:cSld>
   <p:clrMapOvr>
     <a:masterClrMapping/>
@@ -5581,6 +5603,13 @@
       </p:transition>
     </mc:Fallback>
   </mc:AlternateContent>
+  <p:timing>
+    <p:tnLst>
+      <p:par>
+        <p:cTn id="1" dur="indefinite" restart="never" nodeType="tmRoot"/>
+      </p:par>
+    </p:tnLst>
+  </p:timing>
 </p:sldLayout>
 </file>
 
@@ -5618,7 +5647,7 @@
           <a:p>
             <a:fld id="{D76C8610-5B57-4C6B-BF9F-F5397A1F60B8}" type="datetime1">
               <a:rPr lang="en-US" smtClean="0"/>
-              <a:t>2/9/17</a:t>
+              <a:t>2/10/17</a:t>
             </a:fld>
             <a:endParaRPr lang="en-US" dirty="0"/>
           </a:p>
@@ -5668,11 +5697,6 @@
         </p:txBody>
       </p:sp>
     </p:spTree>
-    <p:extLst>
-      <p:ext uri="{BB962C8B-B14F-4D97-AF65-F5344CB8AC3E}">
-        <p14:creationId xmlns:p14="http://schemas.microsoft.com/office/powerpoint/2010/main" val="464605571"/>
-      </p:ext>
-    </p:extLst>
   </p:cSld>
   <p:clrMapOvr>
     <a:masterClrMapping/>
@@ -5689,6 +5713,13 @@
       </p:transition>
     </mc:Fallback>
   </mc:AlternateContent>
+  <p:timing>
+    <p:tnLst>
+      <p:par>
+        <p:cTn id="1" dur="indefinite" restart="never" nodeType="tmRoot"/>
+      </p:par>
+    </p:tnLst>
+  </p:timing>
 </p:sldLayout>
 </file>
 
@@ -5734,7 +5765,7 @@
           </a:lstStyle>
           <a:p>
             <a:r>
-              <a:rPr lang="en-US"/>
+              <a:rPr lang="en-US" smtClean="0"/>
               <a:t>Click to edit Master title style</a:t>
             </a:r>
             <a:endParaRPr lang="en-US" dirty="0"/>
@@ -5793,35 +5824,35 @@
           <a:p>
             <a:pPr lvl="0"/>
             <a:r>
-              <a:rPr lang="en-US"/>
-              <a:t>Edit Master text styles</a:t>
+              <a:rPr lang="en-US" smtClean="0"/>
+              <a:t>Click to edit Master text styles</a:t>
             </a:r>
           </a:p>
           <a:p>
             <a:pPr lvl="1"/>
             <a:r>
-              <a:rPr lang="en-US"/>
+              <a:rPr lang="en-US" smtClean="0"/>
               <a:t>Second level</a:t>
             </a:r>
           </a:p>
           <a:p>
             <a:pPr lvl="2"/>
             <a:r>
-              <a:rPr lang="en-US"/>
+              <a:rPr lang="en-US" smtClean="0"/>
               <a:t>Third level</a:t>
             </a:r>
           </a:p>
           <a:p>
             <a:pPr lvl="3"/>
             <a:r>
-              <a:rPr lang="en-US"/>
+              <a:rPr lang="en-US" smtClean="0"/>
               <a:t>Fourth level</a:t>
             </a:r>
           </a:p>
           <a:p>
             <a:pPr lvl="4"/>
             <a:r>
-              <a:rPr lang="en-US"/>
+              <a:rPr lang="en-US" smtClean="0"/>
               <a:t>Fifth level</a:t>
             </a:r>
             <a:endParaRPr lang="en-US" dirty="0"/>
@@ -5887,8 +5918,8 @@
           <a:p>
             <a:pPr lvl="0"/>
             <a:r>
-              <a:rPr lang="en-US"/>
-              <a:t>Edit Master text styles</a:t>
+              <a:rPr lang="en-US" smtClean="0"/>
+              <a:t>Click to edit Master text styles</a:t>
             </a:r>
           </a:p>
         </p:txBody>
@@ -5910,7 +5941,7 @@
           <a:p>
             <a:fld id="{BADBF3DD-8B6D-46AA-BCA9-242D4EF63DDF}" type="datetime1">
               <a:rPr lang="en-US" smtClean="0"/>
-              <a:t>2/9/17</a:t>
+              <a:t>2/10/17</a:t>
             </a:fld>
             <a:endParaRPr lang="en-US" dirty="0"/>
           </a:p>
@@ -5960,11 +5991,6 @@
         </p:txBody>
       </p:sp>
     </p:spTree>
-    <p:extLst>
-      <p:ext uri="{BB962C8B-B14F-4D97-AF65-F5344CB8AC3E}">
-        <p14:creationId xmlns:p14="http://schemas.microsoft.com/office/powerpoint/2010/main" val="1738958900"/>
-      </p:ext>
-    </p:extLst>
   </p:cSld>
   <p:clrMapOvr>
     <a:masterClrMapping/>
@@ -5981,6 +6007,13 @@
       </p:transition>
     </mc:Fallback>
   </mc:AlternateContent>
+  <p:timing>
+    <p:tnLst>
+      <p:par>
+        <p:cTn id="1" dur="indefinite" restart="never" nodeType="tmRoot"/>
+      </p:par>
+    </p:tnLst>
+  </p:timing>
 </p:sldLayout>
 </file>
 
@@ -6028,7 +6061,7 @@
           </a:lstStyle>
           <a:p>
             <a:r>
-              <a:rPr lang="en-US"/>
+              <a:rPr lang="en-US" smtClean="0"/>
               <a:t>Click to edit Master title style</a:t>
             </a:r>
             <a:endParaRPr lang="en-US" dirty="0"/>
@@ -6107,8 +6140,8 @@
           </a:lstStyle>
           <a:p>
             <a:r>
-              <a:rPr lang="en-US"/>
-              <a:t>Click icon to add picture</a:t>
+              <a:rPr lang="en-US" smtClean="0"/>
+              <a:t>Drag picture to placeholder or click icon to add</a:t>
             </a:r>
             <a:endParaRPr lang="en-US" dirty="0"/>
           </a:p>
@@ -6175,8 +6208,8 @@
           <a:p>
             <a:pPr lvl="0"/>
             <a:r>
-              <a:rPr lang="en-US"/>
-              <a:t>Edit Master text styles</a:t>
+              <a:rPr lang="en-US" smtClean="0"/>
+              <a:t>Click to edit Master text styles</a:t>
             </a:r>
           </a:p>
         </p:txBody>
@@ -6198,7 +6231,7 @@
           <a:p>
             <a:fld id="{23C41AE9-3D4A-4A08-B03D-DC6D2ADF5464}" type="datetime1">
               <a:rPr lang="en-US" smtClean="0"/>
-              <a:t>2/9/17</a:t>
+              <a:t>2/10/17</a:t>
             </a:fld>
             <a:endParaRPr lang="en-US" dirty="0"/>
           </a:p>
@@ -6248,11 +6281,6 @@
         </p:txBody>
       </p:sp>
     </p:spTree>
-    <p:extLst>
-      <p:ext uri="{BB962C8B-B14F-4D97-AF65-F5344CB8AC3E}">
-        <p14:creationId xmlns:p14="http://schemas.microsoft.com/office/powerpoint/2010/main" val="2987239068"/>
-      </p:ext>
-    </p:extLst>
   </p:cSld>
   <p:clrMapOvr>
     <a:masterClrMapping/>
@@ -6269,6 +6297,13 @@
       </p:transition>
     </mc:Fallback>
   </mc:AlternateContent>
+  <p:timing>
+    <p:tnLst>
+      <p:par>
+        <p:cTn id="1" dur="indefinite" restart="never" nodeType="tmRoot"/>
+      </p:par>
+    </p:tnLst>
+  </p:timing>
 </p:sldLayout>
 </file>
 
@@ -6671,7 +6706,7 @@
           <a:lstStyle/>
           <a:p>
             <a:r>
-              <a:rPr lang="en-US"/>
+              <a:rPr lang="en-US" smtClean="0"/>
               <a:t>Click to edit Master title style</a:t>
             </a:r>
             <a:endParaRPr lang="en-US" dirty="0"/>
@@ -6705,35 +6740,35 @@
           <a:p>
             <a:pPr lvl="0"/>
             <a:r>
-              <a:rPr lang="en-US"/>
-              <a:t>Edit Master text styles</a:t>
+              <a:rPr lang="en-US" smtClean="0"/>
+              <a:t>Click to edit Master text styles</a:t>
             </a:r>
           </a:p>
           <a:p>
             <a:pPr lvl="1"/>
             <a:r>
-              <a:rPr lang="en-US"/>
+              <a:rPr lang="en-US" smtClean="0"/>
               <a:t>Second level</a:t>
             </a:r>
           </a:p>
           <a:p>
             <a:pPr lvl="2"/>
             <a:r>
-              <a:rPr lang="en-US"/>
+              <a:rPr lang="en-US" smtClean="0"/>
               <a:t>Third level</a:t>
             </a:r>
           </a:p>
           <a:p>
             <a:pPr lvl="3"/>
             <a:r>
-              <a:rPr lang="en-US"/>
+              <a:rPr lang="en-US" smtClean="0"/>
               <a:t>Fourth level</a:t>
             </a:r>
           </a:p>
           <a:p>
             <a:pPr lvl="4"/>
             <a:r>
-              <a:rPr lang="en-US"/>
+              <a:rPr lang="en-US" smtClean="0"/>
               <a:t>Fifth level</a:t>
             </a:r>
             <a:endParaRPr lang="en-US" dirty="0"/>
@@ -6776,7 +6811,7 @@
           <a:p>
             <a:fld id="{5C6E67D0-0200-42BE-A0B2-78C70FBBB312}" type="datetime1">
               <a:rPr lang="en-US" smtClean="0"/>
-              <a:t>2/9/17</a:t>
+              <a:t>2/10/17</a:t>
             </a:fld>
             <a:endParaRPr lang="en-US" dirty="0"/>
           </a:p>
@@ -6899,29 +6934,29 @@
     </p:spTree>
     <p:extLst>
       <p:ext uri="{BB962C8B-B14F-4D97-AF65-F5344CB8AC3E}">
-        <p14:creationId xmlns:p14="http://schemas.microsoft.com/office/powerpoint/2010/main" val="915534"/>
+        <p14:creationId xmlns:p14="http://schemas.microsoft.com/office/powerpoint/2010/main" val="326699188"/>
       </p:ext>
     </p:extLst>
   </p:cSld>
   <p:clrMap bg1="dk1" tx1="lt1" bg2="dk2" tx2="lt2" accent1="accent1" accent2="accent2" accent3="accent3" accent4="accent4" accent5="accent5" accent6="accent6" hlink="hlink" folHlink="folHlink"/>
   <p:sldLayoutIdLst>
-    <p:sldLayoutId id="2147484129" r:id="rId1"/>
-    <p:sldLayoutId id="2147484130" r:id="rId2"/>
-    <p:sldLayoutId id="2147484131" r:id="rId3"/>
-    <p:sldLayoutId id="2147484132" r:id="rId4"/>
-    <p:sldLayoutId id="2147484133" r:id="rId5"/>
-    <p:sldLayoutId id="2147484134" r:id="rId6"/>
-    <p:sldLayoutId id="2147484135" r:id="rId7"/>
-    <p:sldLayoutId id="2147484136" r:id="rId8"/>
-    <p:sldLayoutId id="2147484137" r:id="rId9"/>
-    <p:sldLayoutId id="2147484138" r:id="rId10"/>
-    <p:sldLayoutId id="2147484139" r:id="rId11"/>
-    <p:sldLayoutId id="2147484140" r:id="rId12"/>
-    <p:sldLayoutId id="2147484141" r:id="rId13"/>
-    <p:sldLayoutId id="2147484142" r:id="rId14"/>
-    <p:sldLayoutId id="2147484143" r:id="rId15"/>
-    <p:sldLayoutId id="2147484144" r:id="rId16"/>
-    <p:sldLayoutId id="2147484145" r:id="rId17"/>
+    <p:sldLayoutId id="2147484219" r:id="rId1"/>
+    <p:sldLayoutId id="2147484220" r:id="rId2"/>
+    <p:sldLayoutId id="2147484221" r:id="rId3"/>
+    <p:sldLayoutId id="2147484222" r:id="rId4"/>
+    <p:sldLayoutId id="2147484223" r:id="rId5"/>
+    <p:sldLayoutId id="2147484224" r:id="rId6"/>
+    <p:sldLayoutId id="2147484225" r:id="rId7"/>
+    <p:sldLayoutId id="2147484226" r:id="rId8"/>
+    <p:sldLayoutId id="2147484227" r:id="rId9"/>
+    <p:sldLayoutId id="2147484228" r:id="rId10"/>
+    <p:sldLayoutId id="2147484229" r:id="rId11"/>
+    <p:sldLayoutId id="2147484230" r:id="rId12"/>
+    <p:sldLayoutId id="2147484231" r:id="rId13"/>
+    <p:sldLayoutId id="2147484232" r:id="rId14"/>
+    <p:sldLayoutId id="2147484233" r:id="rId15"/>
+    <p:sldLayoutId id="2147484234" r:id="rId16"/>
+    <p:sldLayoutId id="2147484235" r:id="rId17"/>
     <p:sldLayoutId id="2147483914" r:id="rId18"/>
   </p:sldLayoutIdLst>
   <mc:AlternateContent xmlns:mc="http://schemas.openxmlformats.org/markup-compatibility/2006" xmlns:p14="http://schemas.microsoft.com/office/powerpoint/2010/main">
@@ -6936,6 +6971,13 @@
       </p:transition>
     </mc:Fallback>
   </mc:AlternateContent>
+  <p:timing>
+    <p:tnLst>
+      <p:par>
+        <p:cTn id="1" dur="indefinite" restart="never" nodeType="tmRoot"/>
+      </p:par>
+    </p:tnLst>
+  </p:timing>
   <p:hf sldNum="0" hdr="0" ftr="0" dt="0"/>
   <p:txStyles>
     <p:titleStyle>
@@ -7365,7 +7407,7 @@
         </p:nvSpPr>
         <p:spPr>
           <a:xfrm>
-            <a:off x="914401" y="1943101"/>
+            <a:off x="914401" y="2269985"/>
             <a:ext cx="8572499" cy="1371600"/>
           </a:xfrm>
         </p:spPr>
@@ -7377,15 +7419,27 @@
           <a:p>
             <a:r>
               <a:rPr lang="en-US" sz="4125" dirty="0"/>
-              <a:t>Capstone project proposal: </a:t>
+              <a:t/>
             </a:r>
             <a:br>
               <a:rPr lang="en-US" sz="4125" dirty="0"/>
             </a:br>
             <a:r>
-              <a:rPr lang="en-US" sz="4125" dirty="0"/>
-              <a:t>EM parameterization of CF composite</a:t>
-            </a:r>
+              <a:rPr lang="en-US" sz="4400" dirty="0"/>
+              <a:t>EM parameterization </a:t>
+            </a:r>
+            <a:r>
+              <a:rPr lang="en-US" sz="4400" dirty="0" smtClean="0"/>
+              <a:t>of</a:t>
+            </a:r>
+            <a:br>
+              <a:rPr lang="en-US" sz="4400" dirty="0" smtClean="0"/>
+            </a:br>
+            <a:r>
+              <a:rPr lang="en-US" sz="4400" dirty="0" smtClean="0"/>
+              <a:t>CF composite absorber</a:t>
+            </a:r>
+            <a:endParaRPr lang="en-US" sz="4400" dirty="0"/>
           </a:p>
         </p:txBody>
       </p:sp>
@@ -7401,13 +7455,13 @@
         </p:nvSpPr>
         <p:spPr>
           <a:xfrm>
-            <a:off x="1028700" y="3543300"/>
-            <a:ext cx="4629150" cy="1143000"/>
+            <a:off x="1028700" y="4343400"/>
+            <a:ext cx="7061187" cy="1562100"/>
           </a:xfrm>
         </p:spPr>
         <p:txBody>
           <a:bodyPr>
-            <a:normAutofit fontScale="70000" lnSpcReduction="20000"/>
+            <a:normAutofit/>
           </a:bodyPr>
           <a:lstStyle/>
           <a:p>
@@ -7417,15 +7471,15 @@
               </a:spcAft>
             </a:pPr>
             <a:r>
-              <a:rPr lang="en-US" dirty="0"/>
+              <a:rPr lang="en-US" sz="1800" dirty="0"/>
               <a:t>Sponsor: </a:t>
             </a:r>
             <a:r>
-              <a:rPr lang="en-US" dirty="0" err="1"/>
+              <a:rPr lang="en-US" sz="1800" dirty="0" err="1"/>
               <a:t>Tangitek</a:t>
             </a:r>
             <a:r>
-              <a:rPr lang="en-US" dirty="0"/>
+              <a:rPr lang="en-US" sz="1800" dirty="0"/>
               <a:t> LLC</a:t>
             </a:r>
           </a:p>
@@ -7436,7 +7490,7 @@
               </a:spcAft>
             </a:pPr>
             <a:r>
-              <a:rPr lang="en-US" dirty="0"/>
+              <a:rPr lang="en-US" sz="1800" dirty="0"/>
               <a:t>Advisor: 	Branimir Pejcinovic</a:t>
             </a:r>
           </a:p>
@@ -7447,7 +7501,7 @@
               </a:spcAft>
             </a:pPr>
             <a:r>
-              <a:rPr lang="en-US" dirty="0"/>
+              <a:rPr lang="en-US" sz="1800" dirty="0"/>
               <a:t>Students: 	Ha Tran, Thanh Le, Jeffrey Brown</a:t>
             </a:r>
           </a:p>
@@ -7457,7 +7511,35 @@
                 <a:spcPts val="450"/>
               </a:spcAft>
             </a:pPr>
-            <a:endParaRPr lang="en-US" dirty="0"/>
+            <a:endParaRPr lang="en-US" sz="1800" dirty="0"/>
+          </a:p>
+        </p:txBody>
+      </p:sp>
+      <p:sp>
+        <p:nvSpPr>
+          <p:cNvPr id="4" name="Rectangle 3"/>
+          <p:cNvSpPr/>
+          <p:nvPr/>
+        </p:nvSpPr>
+        <p:spPr>
+          <a:xfrm>
+            <a:off x="901701" y="1447800"/>
+            <a:ext cx="7188186" cy="707886"/>
+          </a:xfrm>
+          <a:prstGeom prst="rect">
+            <a:avLst/>
+          </a:prstGeom>
+        </p:spPr>
+        <p:txBody>
+          <a:bodyPr wrap="none">
+            <a:spAutoFit/>
+          </a:bodyPr>
+          <a:lstStyle/>
+          <a:p>
+            <a:r>
+              <a:rPr lang="en-US" sz="4000" dirty="0"/>
+              <a:t>Capstone project proposal: </a:t>
+            </a:r>
           </a:p>
         </p:txBody>
       </p:sp>
@@ -7553,11 +7635,7 @@
             </a:r>
             <a:r>
               <a:rPr lang="en-US" dirty="0" smtClean="0"/>
-              <a:t>1 </a:t>
-            </a:r>
-            <a:r>
-              <a:rPr lang="en-US" dirty="0" smtClean="0"/>
-              <a:t>waveguide </a:t>
+              <a:t>1 waveguide </a:t>
             </a:r>
             <a:r>
               <a:rPr lang="en-US" dirty="0"/>
@@ -7581,7 +7659,6 @@
               <a:rPr lang="en-US" dirty="0" smtClean="0"/>
               <a:t>Frequency: 8.20 - 12.40 GHz</a:t>
             </a:r>
-            <a:endParaRPr lang="en-US" dirty="0" smtClean="0"/>
           </a:p>
           <a:p>
             <a:r>
@@ -8001,14 +8078,39 @@
             <p:ph type="title"/>
           </p:nvPr>
         </p:nvSpPr>
-        <p:spPr/>
+        <p:spPr>
+          <a:xfrm>
+            <a:off x="329568" y="457200"/>
+            <a:ext cx="7592490" cy="1400530"/>
+          </a:xfrm>
+        </p:spPr>
         <p:txBody>
           <a:bodyPr/>
           <a:lstStyle/>
           <a:p>
             <a:r>
-              <a:rPr lang="en-US" dirty="0" smtClean="0"/>
-              <a:t>Sample holder here</a:t>
+              <a:rPr lang="en-US" smtClean="0"/>
+              <a:t>Sample </a:t>
+            </a:r>
+            <a:r>
+              <a:rPr lang="en-US" smtClean="0"/>
+              <a:t>Holder </a:t>
+            </a:r>
+            <a:r>
+              <a:rPr lang="en-US"/>
+              <a:t>I</a:t>
+            </a:r>
+            <a:r>
+              <a:rPr lang="en-US" smtClean="0"/>
+              <a:t>nitial </a:t>
+            </a:r>
+            <a:r>
+              <a:rPr lang="en-US" dirty="0"/>
+              <a:t>D</a:t>
+            </a:r>
+            <a:r>
+              <a:rPr lang="en-US" smtClean="0"/>
+              <a:t>esign</a:t>
             </a:r>
             <a:endParaRPr lang="en-US" dirty="0"/>
           </a:p>
@@ -8421,8 +8523,13 @@
           <a:p>
             <a:r>
               <a:rPr lang="en-US" dirty="0" smtClean="0"/>
-              <a:t>Sample with various size: (all with thickness of 2 mm)</a:t>
-            </a:r>
+              <a:t>Sample with various size</a:t>
+            </a:r>
+            <a:r>
+              <a:rPr lang="en-US" dirty="0" smtClean="0"/>
+              <a:t>:</a:t>
+            </a:r>
+            <a:endParaRPr lang="en-US" dirty="0" smtClean="0"/>
           </a:p>
           <a:p>
             <a:pPr lvl="1"/>
@@ -8432,23 +8539,49 @@
             </a:r>
             <a:r>
               <a:rPr lang="en-US" dirty="0" smtClean="0"/>
-              <a:t>):		22.86 </a:t>
+              <a:t>):		</a:t>
+            </a:r>
+            <a:r>
+              <a:rPr lang="en-US" dirty="0" smtClean="0"/>
+              <a:t>22.86 </a:t>
             </a:r>
             <a:r>
               <a:rPr lang="en-US" dirty="0"/>
-              <a:t>mm x 10.16 </a:t>
+              <a:t>x </a:t>
             </a:r>
             <a:r>
               <a:rPr lang="en-US" dirty="0" smtClean="0"/>
-              <a:t>mm</a:t>
-            </a:r>
+              <a:t>10.16 x 5 mm</a:t>
+            </a:r>
+            <a:endParaRPr lang="en-US" dirty="0" smtClean="0"/>
           </a:p>
           <a:p>
             <a:pPr lvl="1"/>
             <a:r>
               <a:rPr lang="en-US" dirty="0"/>
-              <a:t>NRL Arch (up to 18 GHz): 	30 x 30 cm and 60 x 60 cm</a:t>
-            </a:r>
+              <a:t>NRL Arch (up to 18 GHz): 	</a:t>
+            </a:r>
+            <a:r>
+              <a:rPr lang="en-US" dirty="0" smtClean="0"/>
+              <a:t>30 </a:t>
+            </a:r>
+            <a:r>
+              <a:rPr lang="en-US" dirty="0"/>
+              <a:t>x </a:t>
+            </a:r>
+            <a:r>
+              <a:rPr lang="en-US" dirty="0" smtClean="0"/>
+              <a:t>30 x 0.2 cm 											60 </a:t>
+            </a:r>
+            <a:r>
+              <a:rPr lang="en-US" dirty="0"/>
+              <a:t>x 60 </a:t>
+            </a:r>
+            <a:r>
+              <a:rPr lang="en-US" dirty="0" smtClean="0"/>
+              <a:t>x 0.2 cm</a:t>
+            </a:r>
+            <a:endParaRPr lang="en-US" dirty="0"/>
           </a:p>
           <a:p>
             <a:pPr marL="342906" lvl="1" indent="-342906"/>
@@ -8737,7 +8870,11 @@
           <a:p>
             <a:r>
               <a:rPr lang="en-US" sz="3000" dirty="0" smtClean="0"/>
-              <a:t>Related Documents and References</a:t>
+              <a:t>Related </a:t>
+            </a:r>
+            <a:r>
+              <a:rPr lang="en-US" sz="3000" dirty="0" smtClean="0"/>
+              <a:t>Documents</a:t>
             </a:r>
             <a:endParaRPr lang="en-US" sz="3000" dirty="0"/>
           </a:p>
@@ -8993,20 +9130,24 @@
           </a:lstStyle>
           <a:p>
             <a:r>
-              <a:rPr lang="en-US" sz="1600" smtClean="0"/>
-              <a:t>All related documents are available on GitHub</a:t>
-            </a:r>
-            <a:r>
-              <a:rPr lang="en-US" sz="1600" smtClean="0">
-                <a:hlinkClick r:id="rId2"/>
-              </a:rPr>
-              <a:t> https://</a:t>
+              <a:rPr lang="en-US" sz="1600" dirty="0" smtClean="0"/>
+              <a:t>All related documents are available on </a:t>
+            </a:r>
+            <a:r>
+              <a:rPr lang="en-US" sz="1600" dirty="0" smtClean="0"/>
+              <a:t>GitHub</a:t>
             </a:r>
             <a:r>
               <a:rPr lang="en-US" sz="1600" dirty="0" smtClean="0">
                 <a:hlinkClick r:id="rId2"/>
               </a:rPr>
-              <a:t>github.com/trankhiemha/ECE412-413-Capstone-Project-N3</a:t>
+              <a:t> https</a:t>
+            </a:r>
+            <a:r>
+              <a:rPr lang="en-US" sz="1600" dirty="0" smtClean="0">
+                <a:hlinkClick r:id="rId2"/>
+              </a:rPr>
+              <a:t>://github.com/trankhiemha/ECE412-413-Capstone-Project-N3</a:t>
             </a:r>
             <a:endParaRPr lang="en-US" sz="1600" dirty="0" smtClean="0"/>
           </a:p>
@@ -9056,6 +9197,271 @@
     <p:extLst>
       <p:ext uri="{BB962C8B-B14F-4D97-AF65-F5344CB8AC3E}">
         <p14:creationId xmlns:p14="http://schemas.microsoft.com/office/powerpoint/2010/main" val="1200217142"/>
+      </p:ext>
+    </p:extLst>
+  </p:cSld>
+  <p:clrMapOvr>
+    <a:masterClrMapping/>
+  </p:clrMapOvr>
+  <mc:AlternateContent xmlns:mc="http://schemas.openxmlformats.org/markup-compatibility/2006" xmlns:p14="http://schemas.microsoft.com/office/powerpoint/2010/main">
+    <mc:Choice Requires="p14">
+      <p:transition spd="med" p14:dur="700">
+        <p:fade/>
+      </p:transition>
+    </mc:Choice>
+    <mc:Fallback xmlns="">
+      <p:transition spd="med">
+        <p:fade/>
+      </p:transition>
+    </mc:Fallback>
+  </mc:AlternateContent>
+</p:sld>
+</file>
+
+<file path=ppt/slides/slide16.xml><?xml version="1.0" encoding="utf-8"?>
+<p:sld xmlns:a="http://schemas.openxmlformats.org/drawingml/2006/main" xmlns:r="http://schemas.openxmlformats.org/officeDocument/2006/relationships" xmlns:p="http://schemas.openxmlformats.org/presentationml/2006/main">
+  <p:cSld>
+    <p:spTree>
+      <p:nvGrpSpPr>
+        <p:cNvPr id="1" name=""/>
+        <p:cNvGrpSpPr/>
+        <p:nvPr/>
+      </p:nvGrpSpPr>
+      <p:grpSpPr>
+        <a:xfrm>
+          <a:off x="0" y="0"/>
+          <a:ext cx="0" cy="0"/>
+          <a:chOff x="0" y="0"/>
+          <a:chExt cx="0" cy="0"/>
+        </a:xfrm>
+      </p:grpSpPr>
+      <p:sp>
+        <p:nvSpPr>
+          <p:cNvPr id="2" name="Title 1"/>
+          <p:cNvSpPr>
+            <a:spLocks noGrp="1"/>
+          </p:cNvSpPr>
+          <p:nvPr>
+            <p:ph type="title"/>
+          </p:nvPr>
+        </p:nvSpPr>
+        <p:spPr/>
+        <p:txBody>
+          <a:bodyPr/>
+          <a:lstStyle/>
+          <a:p>
+            <a:r>
+              <a:rPr lang="en-US" dirty="0" smtClean="0"/>
+              <a:t>Reference</a:t>
+            </a:r>
+            <a:endParaRPr lang="en-US" dirty="0"/>
+          </a:p>
+        </p:txBody>
+      </p:sp>
+      <p:sp>
+        <p:nvSpPr>
+          <p:cNvPr id="3" name="Content Placeholder 2"/>
+          <p:cNvSpPr>
+            <a:spLocks noGrp="1"/>
+          </p:cNvSpPr>
+          <p:nvPr>
+            <p:ph idx="1"/>
+          </p:nvPr>
+        </p:nvSpPr>
+        <p:spPr>
+          <a:xfrm>
+            <a:off x="815736" y="1524000"/>
+            <a:ext cx="6194664" cy="4724400"/>
+          </a:xfrm>
+        </p:spPr>
+        <p:txBody>
+          <a:bodyPr>
+            <a:normAutofit fontScale="77500" lnSpcReduction="20000"/>
+          </a:bodyPr>
+          <a:lstStyle/>
+          <a:p>
+            <a:pPr marL="0" indent="0">
+              <a:buNone/>
+            </a:pPr>
+            <a:r>
+              <a:rPr lang="en-US" dirty="0"/>
+              <a:t>[1]	K. </a:t>
+            </a:r>
+            <a:r>
+              <a:rPr lang="en-US" dirty="0" err="1"/>
+              <a:t>Belvin</a:t>
+            </a:r>
+            <a:r>
+              <a:rPr lang="en-US" dirty="0"/>
+              <a:t>, “Examining 3D Printed Antennas For Space Based Applications,” 2015</a:t>
+            </a:r>
+            <a:r>
+              <a:rPr lang="en-US" dirty="0" smtClean="0"/>
+              <a:t>.</a:t>
+            </a:r>
+          </a:p>
+          <a:p>
+            <a:pPr marL="0" indent="0">
+              <a:buNone/>
+            </a:pPr>
+            <a:endParaRPr lang="en-US" dirty="0"/>
+          </a:p>
+          <a:p>
+            <a:pPr marL="0" indent="0">
+              <a:buNone/>
+            </a:pPr>
+            <a:r>
+              <a:rPr lang="en-US" dirty="0"/>
+              <a:t>[2]	Christos </a:t>
+            </a:r>
+            <a:r>
+              <a:rPr lang="en-US" dirty="0" err="1"/>
+              <a:t>Tsipogiannis</a:t>
+            </a:r>
+            <a:r>
+              <a:rPr lang="en-US" dirty="0"/>
+              <a:t>, “Microwave materials characterization using waveguides and coaxial probe.” [Online]. Available: http://</a:t>
+            </a:r>
+            <a:r>
+              <a:rPr lang="en-US" dirty="0" err="1"/>
+              <a:t>lup.lub.lu.se</a:t>
+            </a:r>
+            <a:r>
+              <a:rPr lang="en-US" dirty="0"/>
+              <a:t>/</a:t>
+            </a:r>
+            <a:r>
+              <a:rPr lang="en-US" dirty="0" err="1"/>
+              <a:t>luur</a:t>
+            </a:r>
+            <a:r>
+              <a:rPr lang="en-US" dirty="0"/>
+              <a:t>/</a:t>
+            </a:r>
+            <a:r>
+              <a:rPr lang="en-US" dirty="0" err="1"/>
+              <a:t>download?func</a:t>
+            </a:r>
+            <a:r>
+              <a:rPr lang="en-US" dirty="0"/>
+              <a:t>=</a:t>
+            </a:r>
+            <a:r>
+              <a:rPr lang="en-US" dirty="0" err="1"/>
+              <a:t>downloadFile&amp;recordOId</a:t>
+            </a:r>
+            <a:r>
+              <a:rPr lang="en-US" dirty="0"/>
+              <a:t>=3359623&amp;fileOId=3359627. [Accessed: 30-Jan-2017</a:t>
+            </a:r>
+            <a:r>
+              <a:rPr lang="en-US" dirty="0" smtClean="0"/>
+              <a:t>].</a:t>
+            </a:r>
+          </a:p>
+          <a:p>
+            <a:pPr marL="0" indent="0">
+              <a:buNone/>
+            </a:pPr>
+            <a:endParaRPr lang="en-US" dirty="0"/>
+          </a:p>
+          <a:p>
+            <a:pPr marL="0" indent="0">
+              <a:buNone/>
+            </a:pPr>
+            <a:r>
+              <a:rPr lang="en-US" dirty="0"/>
+              <a:t>[3]	&lt;p&gt;Tian Zhou*, D. </a:t>
+            </a:r>
+            <a:r>
+              <a:rPr lang="en-US" dirty="0" err="1"/>
+              <a:t>Wel</a:t>
+            </a:r>
+            <a:r>
+              <a:rPr lang="en-US" dirty="0"/>
+              <a:t>, S. Yang, G. Xu, and C. J. and Z. Zhao&lt;/p&gt;, “Measurement and Characterization of Flexible Absorbing Materials for Applications in Wireless Communication,” </a:t>
+            </a:r>
+            <a:r>
+              <a:rPr lang="en-US" i="1" dirty="0"/>
+              <a:t>J. Sci. Ind. </a:t>
+            </a:r>
+            <a:r>
+              <a:rPr lang="en-US" i="1" dirty="0" err="1"/>
+              <a:t>Metrol</a:t>
+            </a:r>
+            <a:r>
+              <a:rPr lang="en-US" i="1" dirty="0"/>
+              <a:t>.</a:t>
+            </a:r>
+            <a:r>
+              <a:rPr lang="en-US" dirty="0"/>
+              <a:t>, 2016</a:t>
+            </a:r>
+            <a:r>
+              <a:rPr lang="en-US" dirty="0" smtClean="0"/>
+              <a:t>.</a:t>
+            </a:r>
+          </a:p>
+          <a:p>
+            <a:pPr marL="0" indent="0">
+              <a:buNone/>
+            </a:pPr>
+            <a:endParaRPr lang="en-US" dirty="0"/>
+          </a:p>
+          <a:p>
+            <a:pPr marL="0" indent="0">
+              <a:buNone/>
+            </a:pPr>
+            <a:r>
+              <a:rPr lang="en-US" dirty="0"/>
+              <a:t>[4]	L. F. Chen, C. K. Ong, C. P. Neo, V. V. </a:t>
+            </a:r>
+            <a:r>
+              <a:rPr lang="en-US" dirty="0" err="1"/>
+              <a:t>Varadan</a:t>
+            </a:r>
+            <a:r>
+              <a:rPr lang="en-US" dirty="0"/>
+              <a:t>, and V. K. </a:t>
+            </a:r>
+            <a:r>
+              <a:rPr lang="en-US" dirty="0" err="1"/>
+              <a:t>Varadan</a:t>
+            </a:r>
+            <a:r>
+              <a:rPr lang="en-US" dirty="0"/>
+              <a:t>, “Transmission/Reflection Methods,” in </a:t>
+            </a:r>
+            <a:r>
+              <a:rPr lang="en-US" i="1" dirty="0"/>
+              <a:t>Microwave Electronics</a:t>
+            </a:r>
+            <a:r>
+              <a:rPr lang="en-US" dirty="0"/>
+              <a:t>, John Wiley &amp; Sons, Ltd, 2004, pp. 175–207.</a:t>
+            </a:r>
+          </a:p>
+          <a:p>
+            <a:pPr marL="0" indent="0">
+              <a:buNone/>
+            </a:pPr>
+            <a:r>
+              <a:rPr lang="en-US" dirty="0"/>
+              <a:t> </a:t>
+            </a:r>
+          </a:p>
+          <a:p>
+            <a:pPr marL="0" indent="0" algn="just">
+              <a:buNone/>
+            </a:pPr>
+            <a:endParaRPr lang="en-US" dirty="0"/>
+          </a:p>
+        </p:txBody>
+      </p:sp>
+    </p:spTree>
+    <p:extLst>
+      <p:ext uri="{BB962C8B-B14F-4D97-AF65-F5344CB8AC3E}">
+        <p14:creationId xmlns:p14="http://schemas.microsoft.com/office/powerpoint/2010/main" val="1784663655"/>
       </p:ext>
     </p:extLst>
   </p:cSld>
@@ -9340,15 +9746,7 @@
             <a:pPr lvl="1"/>
             <a:r>
               <a:rPr lang="en-US" dirty="0" smtClean="0"/>
-              <a:t>EM Parameters </a:t>
-            </a:r>
-            <a:r>
-              <a:rPr lang="en-US" dirty="0" smtClean="0"/>
-              <a:t>e</a:t>
-            </a:r>
-            <a:r>
-              <a:rPr lang="en-US" dirty="0" smtClean="0"/>
-              <a:t>xtraction: use NRW algorithm and MATLAB</a:t>
+              <a:t>EM Parameters extraction: use NRW algorithm and MATLAB</a:t>
             </a:r>
           </a:p>
           <a:p>
@@ -9381,7 +9779,11 @@
             <a:pPr lvl="1"/>
             <a:r>
               <a:rPr lang="en-US" dirty="0" smtClean="0"/>
-              <a:t> Expand frequency range</a:t>
+              <a:t>Expand </a:t>
+            </a:r>
+            <a:r>
+              <a:rPr lang="en-US" dirty="0" smtClean="0"/>
+              <a:t>frequency range</a:t>
             </a:r>
           </a:p>
           <a:p>
@@ -9397,7 +9799,6 @@
               <a:rPr lang="en-US" dirty="0" smtClean="0"/>
               <a:t>Back-up and presentation</a:t>
             </a:r>
-            <a:endParaRPr lang="en-US" dirty="0" smtClean="0"/>
           </a:p>
           <a:p>
             <a:pPr lvl="1"/>
@@ -9559,7 +9960,11 @@
             </a:r>
             <a:r>
               <a:rPr lang="en-US" dirty="0" smtClean="0"/>
-              <a:t>extraction based on NRW algorithm</a:t>
+              <a:t>extraction based on NRW </a:t>
+            </a:r>
+            <a:r>
+              <a:rPr lang="en-US" dirty="0" smtClean="0"/>
+              <a:t>algorithm [1], [2]</a:t>
             </a:r>
             <a:endParaRPr lang="en-US" dirty="0"/>
           </a:p>
@@ -9724,13 +10129,8 @@
             </a:pPr>
             <a:r>
               <a:rPr lang="en-US" dirty="0" smtClean="0"/>
-              <a:t>Antennas alignment </a:t>
-            </a:r>
-            <a:r>
-              <a:rPr lang="en-US" dirty="0" smtClean="0"/>
-              <a:t>is hard to be perfect.</a:t>
-            </a:r>
-            <a:endParaRPr lang="en-US" dirty="0" smtClean="0"/>
+              <a:t>Antennas alignment is hard to be perfect.</a:t>
+            </a:r>
           </a:p>
           <a:p>
             <a:pPr marL="800107" lvl="1" indent="-342900" algn="just">
@@ -9768,11 +10168,7 @@
             </a:r>
             <a:r>
               <a:rPr lang="en-US" dirty="0" smtClean="0"/>
-              <a:t>align</a:t>
-            </a:r>
-            <a:r>
-              <a:rPr lang="en-US" dirty="0" smtClean="0"/>
-              <a:t>.</a:t>
+              <a:t>align.</a:t>
             </a:r>
             <a:endParaRPr lang="en-US" dirty="0"/>
           </a:p>
@@ -9857,8 +10253,13 @@
             </a:r>
             <a:r>
               <a:rPr lang="en-US" dirty="0"/>
-              <a:t>60cm x 60 cm for practical measurement</a:t>
-            </a:r>
+              <a:t>60cm x 60 cm for practical </a:t>
+            </a:r>
+            <a:r>
+              <a:rPr lang="en-US" dirty="0" smtClean="0"/>
+              <a:t>measurement [3]</a:t>
+            </a:r>
+            <a:endParaRPr lang="en-US" dirty="0"/>
           </a:p>
           <a:p>
             <a:pPr marL="800107" lvl="1" indent="-342900" algn="just">
@@ -9889,8 +10290,13 @@
             </a:pPr>
             <a:r>
               <a:rPr lang="en-US" dirty="0" smtClean="0"/>
-              <a:t>Design the sample holder waveguide short to fix the sample in easier then connect with 2 extensional waveguides and 2 waveguide adapters.</a:t>
-            </a:r>
+              <a:t>Design the sample holder waveguide short to fix the sample in easier then connect with 2 extensional waveguides and 2 waveguide adapters</a:t>
+            </a:r>
+            <a:r>
+              <a:rPr lang="en-US" dirty="0" smtClean="0"/>
+              <a:t>. [3]</a:t>
+            </a:r>
+            <a:endParaRPr lang="en-US" dirty="0" smtClean="0"/>
           </a:p>
           <a:p>
             <a:pPr>
@@ -10545,6 +10951,10 @@
             <a:r>
               <a:rPr lang="en-US" sz="900" dirty="0" err="1" smtClean="0"/>
               <a:t>Characterizationv</a:t>
+            </a:r>
+            <a:r>
+              <a:rPr lang="en-US" sz="900" dirty="0" smtClean="0"/>
+              <a:t> [4]</a:t>
             </a:r>
             <a:endParaRPr lang="en-US" sz="900" dirty="0"/>
           </a:p>
@@ -10805,7 +11215,11 @@
             </a:r>
             <a:r>
               <a:rPr lang="en-US" sz="1500" dirty="0" smtClean="0"/>
-              <a:t>Microwave Electronics </a:t>
+              <a:t>Microwave </a:t>
+            </a:r>
+            <a:r>
+              <a:rPr lang="en-US" sz="1500" dirty="0" smtClean="0"/>
+              <a:t>Electronics [4] </a:t>
             </a:r>
             <a:r>
               <a:rPr lang="en-US" sz="1500" dirty="0"/>
@@ -10905,18 +11319,18 @@
             </a:r>
             <a:r>
               <a:rPr lang="en-US" sz="900" dirty="0" smtClean="0"/>
-              <a:t>, Master Thesis</a:t>
+              <a:t>, Master Thesis, Lund University, </a:t>
+            </a:r>
+            <a:endParaRPr lang="en-US" sz="900" dirty="0"/>
+          </a:p>
+          <a:p>
+            <a:r>
+              <a:rPr lang="en-US" sz="900" dirty="0"/>
+              <a:t>Microwave materials characterization using waveguides and coaxial </a:t>
             </a:r>
             <a:r>
               <a:rPr lang="en-US" sz="900" dirty="0" smtClean="0"/>
-              <a:t>, Lund University, </a:t>
-            </a:r>
-            <a:endParaRPr lang="en-US" sz="900" dirty="0"/>
-          </a:p>
-          <a:p>
-            <a:r>
-              <a:rPr lang="en-US" sz="900" dirty="0"/>
-              <a:t>Microwave materials characterization using waveguides and coaxial probe</a:t>
+              <a:t>probe [2]</a:t>
             </a:r>
             <a:endParaRPr lang="en-US" sz="900" dirty="0"/>
           </a:p>
@@ -10950,7 +11364,7 @@
 <file path=ppt/theme/theme1.xml><?xml version="1.0" encoding="utf-8"?>
 <a:theme xmlns:a="http://schemas.openxmlformats.org/drawingml/2006/main" name="Ion">
   <a:themeElements>
-    <a:clrScheme name="Ion">
+    <a:clrScheme name="Yellow Orange">
       <a:dk1>
         <a:sysClr val="windowText" lastClr="000000"/>
       </a:dk1>
@@ -10958,34 +11372,34 @@
         <a:sysClr val="window" lastClr="FFFFFF"/>
       </a:lt1>
       <a:dk2>
-        <a:srgbClr val="1E5155"/>
+        <a:srgbClr val="4E3B30"/>
       </a:dk2>
       <a:lt2>
-        <a:srgbClr val="EBEBEB"/>
+        <a:srgbClr val="FBEEC9"/>
       </a:lt2>
       <a:accent1>
-        <a:srgbClr val="B01513"/>
+        <a:srgbClr val="F0A22E"/>
       </a:accent1>
       <a:accent2>
-        <a:srgbClr val="EA6312"/>
+        <a:srgbClr val="A5644E"/>
       </a:accent2>
       <a:accent3>
-        <a:srgbClr val="E6B729"/>
+        <a:srgbClr val="B58B80"/>
       </a:accent3>
       <a:accent4>
-        <a:srgbClr val="6AAC90"/>
+        <a:srgbClr val="C3986D"/>
       </a:accent4>
       <a:accent5>
-        <a:srgbClr val="5F9C9D"/>
+        <a:srgbClr val="A19574"/>
       </a:accent5>
       <a:accent6>
-        <a:srgbClr val="9E5E9B"/>
+        <a:srgbClr val="C17529"/>
       </a:accent6>
       <a:hlink>
-        <a:srgbClr val="58C1BA"/>
+        <a:srgbClr val="AD1F1F"/>
       </a:hlink>
       <a:folHlink>
-        <a:srgbClr val="9DD0CB"/>
+        <a:srgbClr val="FFC42F"/>
       </a:folHlink>
     </a:clrScheme>
     <a:fontScheme name="Ion">

</xml_diff>